<commit_message>
add task code file
</commit_message>
<xml_diff>
--- a/lec2.pptx
+++ b/lec2.pptx
@@ -5,7 +5,7 @@
     <p:sldMasterId id="2147483745" r:id="rId1"/>
   </p:sldMasterIdLst>
   <p:notesMasterIdLst>
-    <p:notesMasterId r:id="rId15"/>
+    <p:notesMasterId r:id="rId16"/>
   </p:notesMasterIdLst>
   <p:sldIdLst>
     <p:sldId id="256" r:id="rId2"/>
@@ -21,6 +21,7 @@
     <p:sldId id="285" r:id="rId12"/>
     <p:sldId id="286" r:id="rId13"/>
     <p:sldId id="284" r:id="rId14"/>
+    <p:sldId id="287" r:id="rId15"/>
   </p:sldIdLst>
   <p:sldSz cx="12192000" cy="6858000"/>
   <p:notesSz cx="6858000" cy="9144000"/>
@@ -119,6 +120,11 @@
       </a:defRPr>
     </a:lvl9pPr>
   </p:defaultTextStyle>
+  <p:extLst>
+    <p:ext uri="{EFAFB233-063F-42B5-8137-9DF3F51BA10A}">
+      <p15:sldGuideLst xmlns:p15="http://schemas.microsoft.com/office/powerpoint/2012/main"/>
+    </p:ext>
+  </p:extLst>
 </p:presentation>
 </file>
 
@@ -8558,6 +8564,158 @@
 </p:sld>
 </file>
 
+<file path=ppt/slides/slide14.xml><?xml version="1.0" encoding="utf-8"?>
+<p:sld xmlns:a="http://schemas.openxmlformats.org/drawingml/2006/main" xmlns:r="http://schemas.openxmlformats.org/officeDocument/2006/relationships" xmlns:p="http://schemas.openxmlformats.org/presentationml/2006/main">
+  <p:cSld>
+    <p:spTree>
+      <p:nvGrpSpPr>
+        <p:cNvPr id="1" name=""/>
+        <p:cNvGrpSpPr/>
+        <p:nvPr/>
+      </p:nvGrpSpPr>
+      <p:grpSpPr>
+        <a:xfrm>
+          <a:off x="0" y="0"/>
+          <a:ext cx="0" cy="0"/>
+          <a:chOff x="0" y="0"/>
+          <a:chExt cx="0" cy="0"/>
+        </a:xfrm>
+      </p:grpSpPr>
+      <p:sp>
+        <p:nvSpPr>
+          <p:cNvPr id="2" name="TextBox 1">
+            <a:extLst>
+              <a:ext uri="{FF2B5EF4-FFF2-40B4-BE49-F238E27FC236}">
+                <a16:creationId xmlns:a16="http://schemas.microsoft.com/office/drawing/2014/main" id="{B0C3FB8B-85C2-43F1-A4C3-8E05561DC480}"/>
+              </a:ext>
+            </a:extLst>
+          </p:cNvPr>
+          <p:cNvSpPr txBox="1"/>
+          <p:nvPr/>
+        </p:nvSpPr>
+        <p:spPr>
+          <a:xfrm>
+            <a:off x="436099" y="562708"/>
+            <a:ext cx="2475914" cy="523220"/>
+          </a:xfrm>
+          <a:prstGeom prst="rect">
+            <a:avLst/>
+          </a:prstGeom>
+          <a:noFill/>
+        </p:spPr>
+        <p:txBody>
+          <a:bodyPr wrap="square" rtlCol="1">
+            <a:spAutoFit/>
+          </a:bodyPr>
+          <a:lstStyle/>
+          <a:p>
+            <a:r>
+              <a:rPr lang="en-US" sz="2800" b="1" dirty="0">
+                <a:solidFill>
+                  <a:schemeClr val="accent2">
+                    <a:lumMod val="50000"/>
+                  </a:schemeClr>
+                </a:solidFill>
+              </a:rPr>
+              <a:t>Solution:</a:t>
+            </a:r>
+            <a:endParaRPr lang="ar-SA" sz="2800" b="1" dirty="0">
+              <a:solidFill>
+                <a:schemeClr val="accent2">
+                  <a:lumMod val="50000"/>
+                </a:schemeClr>
+              </a:solidFill>
+            </a:endParaRPr>
+          </a:p>
+        </p:txBody>
+      </p:sp>
+      <p:pic>
+        <p:nvPicPr>
+          <p:cNvPr id="3" name="Picture 2">
+            <a:extLst>
+              <a:ext uri="{FF2B5EF4-FFF2-40B4-BE49-F238E27FC236}">
+                <a16:creationId xmlns:a16="http://schemas.microsoft.com/office/drawing/2014/main" id="{B15AB6CA-7F23-4DB0-9E3C-C467DC0C4739}"/>
+              </a:ext>
+            </a:extLst>
+          </p:cNvPr>
+          <p:cNvPicPr>
+            <a:picLocks noChangeAspect="1"/>
+          </p:cNvPicPr>
+          <p:nvPr/>
+        </p:nvPicPr>
+        <p:blipFill>
+          <a:blip r:embed="rId2"/>
+          <a:stretch>
+            <a:fillRect/>
+          </a:stretch>
+        </p:blipFill>
+        <p:spPr>
+          <a:xfrm>
+            <a:off x="703385" y="1252025"/>
+            <a:ext cx="6884746" cy="4520047"/>
+          </a:xfrm>
+          <a:prstGeom prst="rect">
+            <a:avLst/>
+          </a:prstGeom>
+        </p:spPr>
+      </p:pic>
+      <p:sp>
+        <p:nvSpPr>
+          <p:cNvPr id="4" name="TextBox 3">
+            <a:extLst>
+              <a:ext uri="{FF2B5EF4-FFF2-40B4-BE49-F238E27FC236}">
+                <a16:creationId xmlns:a16="http://schemas.microsoft.com/office/drawing/2014/main" id="{91D48931-2677-42F2-8876-FCF2DB37B273}"/>
+              </a:ext>
+            </a:extLst>
+          </p:cNvPr>
+          <p:cNvSpPr txBox="1"/>
+          <p:nvPr/>
+        </p:nvSpPr>
+        <p:spPr>
+          <a:xfrm>
+            <a:off x="703385" y="6295292"/>
+            <a:ext cx="3334043" cy="369332"/>
+          </a:xfrm>
+          <a:prstGeom prst="rect">
+            <a:avLst/>
+          </a:prstGeom>
+          <a:noFill/>
+        </p:spPr>
+        <p:txBody>
+          <a:bodyPr wrap="square" rtlCol="1">
+            <a:spAutoFit/>
+          </a:bodyPr>
+          <a:lstStyle/>
+          <a:p>
+            <a:r>
+              <a:rPr lang="en-US" dirty="0"/>
+              <a:t>Open </a:t>
+            </a:r>
+            <a:r>
+              <a:rPr lang="en-US" dirty="0" err="1"/>
+              <a:t>task.m</a:t>
+            </a:r>
+            <a:r>
+              <a:rPr lang="en-US" dirty="0"/>
+              <a:t> file </a:t>
+            </a:r>
+            <a:endParaRPr lang="ar-SA" dirty="0"/>
+          </a:p>
+        </p:txBody>
+      </p:sp>
+    </p:spTree>
+    <p:extLst>
+      <p:ext uri="{BB962C8B-B14F-4D97-AF65-F5344CB8AC3E}">
+        <p14:creationId xmlns:p14="http://schemas.microsoft.com/office/powerpoint/2010/main" val="2771995604"/>
+      </p:ext>
+    </p:extLst>
+  </p:cSld>
+  <p:clrMapOvr>
+    <a:masterClrMapping/>
+  </p:clrMapOvr>
+</p:sld>
+</file>
+
 <file path=ppt/slides/slide2.xml><?xml version="1.0" encoding="utf-8"?>
 <p:sld xmlns:a="http://schemas.openxmlformats.org/drawingml/2006/main" xmlns:r="http://schemas.openxmlformats.org/officeDocument/2006/relationships" xmlns:p="http://schemas.openxmlformats.org/presentationml/2006/main">
   <p:cSld>
@@ -8640,7 +8798,7 @@
         <p:spPr>
           <a:xfrm>
             <a:off x="590843" y="1359264"/>
-            <a:ext cx="1544012" cy="369332"/>
+            <a:ext cx="1688283" cy="461665"/>
           </a:xfrm>
           <a:prstGeom prst="rect">
             <a:avLst/>
@@ -8657,10 +8815,7 @@
               <a:buChar char="Ø"/>
             </a:pPr>
             <a:r>
-              <a:rPr lang="en-US">
-                <a:solidFill>
-                  <a:srgbClr val="004B87"/>
-                </a:solidFill>
+              <a:rPr lang="en-US" sz="2400" dirty="0">
                 <a:effectLst>
                   <a:outerShdw blurRad="38100" dist="38100" dir="2700000" algn="tl">
                     <a:srgbClr val="000000">
@@ -8668,14 +8823,12 @@
                     </a:srgbClr>
                   </a:outerShdw>
                 </a:effectLst>
-                <a:latin typeface="Arial" panose="020B0604020202020204" pitchFamily="34" charset="0"/>
+                <a:latin typeface="Times New Roman" panose="02020603050405020304" pitchFamily="18" charset="0"/>
+                <a:cs typeface="Times New Roman" panose="02020603050405020304" pitchFamily="18" charset="0"/>
               </a:rPr>
               <a:t>Samples</a:t>
             </a:r>
-            <a:endParaRPr lang="ar-SA" dirty="0">
-              <a:solidFill>
-                <a:srgbClr val="004B87"/>
-              </a:solidFill>
+            <a:endParaRPr lang="ar-SA" sz="2400" dirty="0">
               <a:effectLst>
                 <a:outerShdw blurRad="38100" dist="38100" dir="2700000" algn="tl">
                   <a:srgbClr val="000000">
@@ -8683,7 +8836,8 @@
                   </a:srgbClr>
                 </a:outerShdw>
               </a:effectLst>
-              <a:latin typeface="Arial" panose="020B0604020202020204" pitchFamily="34" charset="0"/>
+              <a:latin typeface="Times New Roman" panose="02020603050405020304" pitchFamily="18" charset="0"/>
+              <a:cs typeface="Times New Roman" panose="02020603050405020304" pitchFamily="18" charset="0"/>
             </a:endParaRPr>
           </a:p>
         </p:txBody>
@@ -8703,7 +8857,7 @@
         <p:spPr>
           <a:xfrm>
             <a:off x="590843" y="1833120"/>
-            <a:ext cx="6096000" cy="646331"/>
+            <a:ext cx="6096000" cy="738664"/>
           </a:xfrm>
           <a:prstGeom prst="rect">
             <a:avLst/>
@@ -8720,10 +8874,7 @@
               <a:buChar char="Ø"/>
             </a:pPr>
             <a:r>
-              <a:rPr lang="en-US" dirty="0">
-                <a:solidFill>
-                  <a:srgbClr val="004B87"/>
-                </a:solidFill>
+              <a:rPr lang="en-US" sz="2400" dirty="0">
                 <a:effectLst>
                   <a:outerShdw blurRad="38100" dist="38100" dir="2700000" algn="tl">
                     <a:srgbClr val="000000">
@@ -8731,7 +8882,8 @@
                     </a:srgbClr>
                   </a:outerShdw>
                 </a:effectLst>
-                <a:latin typeface="Arial" panose="020B0604020202020204" pitchFamily="34" charset="0"/>
+                <a:latin typeface="Times New Roman" panose="02020603050405020304" pitchFamily="18" charset="0"/>
+                <a:cs typeface="Times New Roman" panose="02020603050405020304" pitchFamily="18" charset="0"/>
               </a:rPr>
               <a:t>Basic operations  on discreet signals</a:t>
             </a:r>

</xml_diff>

<commit_message>
modify presentation file and add code file
</commit_message>
<xml_diff>
--- a/lec2.pptx
+++ b/lec2.pptx
@@ -1,11 +1,11 @@
 
 <file path=ppt/presentation.xml><?xml version="1.0" encoding="utf-8"?>
-<p:presentation xmlns:a="http://schemas.openxmlformats.org/drawingml/2006/main" xmlns:r="http://schemas.openxmlformats.org/officeDocument/2006/relationships" xmlns:p="http://schemas.openxmlformats.org/presentationml/2006/main" saveSubsetFonts="1">
+<p:presentation xmlns:a="http://schemas.openxmlformats.org/drawingml/2006/main" xmlns:r="http://schemas.openxmlformats.org/officeDocument/2006/relationships" xmlns:p="http://schemas.openxmlformats.org/presentationml/2006/main" showSpecialPlsOnTitleSld="0" saveSubsetFonts="1">
   <p:sldMasterIdLst>
     <p:sldMasterId id="2147483745" r:id="rId1"/>
   </p:sldMasterIdLst>
   <p:notesMasterIdLst>
-    <p:notesMasterId r:id="rId29"/>
+    <p:notesMasterId r:id="rId34"/>
   </p:notesMasterIdLst>
   <p:sldIdLst>
     <p:sldId id="256" r:id="rId2"/>
@@ -33,8 +33,13 @@
     <p:sldId id="266" r:id="rId24"/>
     <p:sldId id="267" r:id="rId25"/>
     <p:sldId id="272" r:id="rId26"/>
-    <p:sldId id="288" r:id="rId27"/>
-    <p:sldId id="289" r:id="rId28"/>
+    <p:sldId id="291" r:id="rId27"/>
+    <p:sldId id="288" r:id="rId28"/>
+    <p:sldId id="289" r:id="rId29"/>
+    <p:sldId id="290" r:id="rId30"/>
+    <p:sldId id="268" r:id="rId31"/>
+    <p:sldId id="269" r:id="rId32"/>
+    <p:sldId id="270" r:id="rId33"/>
   </p:sldIdLst>
   <p:sldSz cx="12192000" cy="6858000"/>
   <p:notesSz cx="6858000" cy="9144000"/>
@@ -1318,7 +1323,7 @@
           <a:bodyPr/>
           <a:lstStyle/>
           <a:p>
-            <a:fld id="{80DAD540-7A9F-4B34-BAEC-EBC745D4E473}" type="datetimeFigureOut">
+            <a:fld id="{14496017-C0AB-427B-B3AE-65A9151CF130}" type="uaqdatetime1">
               <a:rPr lang="ar-SA" smtClean="0"/>
               <a:t>6/17/1440</a:t>
             </a:fld>
@@ -1569,7 +1574,7 @@
           <a:bodyPr/>
           <a:lstStyle/>
           <a:p>
-            <a:fld id="{80DAD540-7A9F-4B34-BAEC-EBC745D4E473}" type="datetimeFigureOut">
+            <a:fld id="{EDA51EC7-8E94-4404-AFD2-BCAF1C46AB9F}" type="uaqdatetime1">
               <a:rPr lang="ar-SA" smtClean="0"/>
               <a:t>6/17/1440</a:t>
             </a:fld>
@@ -1883,7 +1888,7 @@
           <a:bodyPr/>
           <a:lstStyle/>
           <a:p>
-            <a:fld id="{80DAD540-7A9F-4B34-BAEC-EBC745D4E473}" type="datetimeFigureOut">
+            <a:fld id="{DBBA18F1-65F5-407D-BCED-5674C90A8967}" type="uaqdatetime1">
               <a:rPr lang="ar-SA" smtClean="0"/>
               <a:t>6/17/1440</a:t>
             </a:fld>
@@ -2216,7 +2221,7 @@
           <a:bodyPr/>
           <a:lstStyle/>
           <a:p>
-            <a:fld id="{80DAD540-7A9F-4B34-BAEC-EBC745D4E473}" type="datetimeFigureOut">
+            <a:fld id="{58BBB7CF-A38F-4EB8-B746-1DB81A743DB0}" type="uaqdatetime1">
               <a:rPr lang="ar-SA" smtClean="0"/>
               <a:t>6/17/1440</a:t>
             </a:fld>
@@ -2530,7 +2535,7 @@
           <a:bodyPr/>
           <a:lstStyle/>
           <a:p>
-            <a:fld id="{80DAD540-7A9F-4B34-BAEC-EBC745D4E473}" type="datetimeFigureOut">
+            <a:fld id="{5A5B6E51-E927-4CD6-BED0-C4F0A1480D92}" type="uaqdatetime1">
               <a:rPr lang="ar-SA" smtClean="0"/>
               <a:t>6/17/1440</a:t>
             </a:fld>
@@ -2923,7 +2928,7 @@
           <a:bodyPr/>
           <a:lstStyle/>
           <a:p>
-            <a:fld id="{80DAD540-7A9F-4B34-BAEC-EBC745D4E473}" type="datetimeFigureOut">
+            <a:fld id="{A4C55DF5-C366-4921-8B2A-358008F9ACDC}" type="uaqdatetime1">
               <a:rPr lang="ar-SA" smtClean="0"/>
               <a:t>6/17/1440</a:t>
             </a:fld>
@@ -3093,7 +3098,7 @@
           <a:bodyPr/>
           <a:lstStyle/>
           <a:p>
-            <a:fld id="{80DAD540-7A9F-4B34-BAEC-EBC745D4E473}" type="datetimeFigureOut">
+            <a:fld id="{5C0E1518-95A6-43F2-A5EC-DCA568FECEC9}" type="uaqdatetime1">
               <a:rPr lang="ar-SA" smtClean="0"/>
               <a:t>6/17/1440</a:t>
             </a:fld>
@@ -3273,7 +3278,7 @@
           <a:bodyPr/>
           <a:lstStyle/>
           <a:p>
-            <a:fld id="{80DAD540-7A9F-4B34-BAEC-EBC745D4E473}" type="datetimeFigureOut">
+            <a:fld id="{2C6A3EE6-1DDE-48CC-9CA8-BB62811393A6}" type="uaqdatetime1">
               <a:rPr lang="ar-SA" smtClean="0"/>
               <a:t>6/17/1440</a:t>
             </a:fld>
@@ -3443,7 +3448,7 @@
           <a:bodyPr/>
           <a:lstStyle/>
           <a:p>
-            <a:fld id="{80DAD540-7A9F-4B34-BAEC-EBC745D4E473}" type="datetimeFigureOut">
+            <a:fld id="{86A71FEC-9482-4E93-A318-BA78961775C8}" type="uaqdatetime1">
               <a:rPr lang="ar-SA" smtClean="0"/>
               <a:t>6/17/1440</a:t>
             </a:fld>
@@ -3690,7 +3695,7 @@
           <a:bodyPr/>
           <a:lstStyle/>
           <a:p>
-            <a:fld id="{80DAD540-7A9F-4B34-BAEC-EBC745D4E473}" type="datetimeFigureOut">
+            <a:fld id="{DACF1915-4B9C-421F-BE3C-ADC98407F929}" type="uaqdatetime1">
               <a:rPr lang="ar-SA" smtClean="0"/>
               <a:t>6/17/1440</a:t>
             </a:fld>
@@ -3922,7 +3927,7 @@
           <a:bodyPr/>
           <a:lstStyle/>
           <a:p>
-            <a:fld id="{80DAD540-7A9F-4B34-BAEC-EBC745D4E473}" type="datetimeFigureOut">
+            <a:fld id="{C2CDAF00-BFD0-4835-B26D-86C51D73719A}" type="uaqdatetime1">
               <a:rPr lang="ar-SA" smtClean="0"/>
               <a:t>6/17/1440</a:t>
             </a:fld>
@@ -4296,7 +4301,7 @@
           <a:bodyPr/>
           <a:lstStyle/>
           <a:p>
-            <a:fld id="{80DAD540-7A9F-4B34-BAEC-EBC745D4E473}" type="datetimeFigureOut">
+            <a:fld id="{2E53281C-7FD1-47B0-9C1F-AF2BF3C76524}" type="uaqdatetime1">
               <a:rPr lang="ar-SA" smtClean="0"/>
               <a:t>6/17/1440</a:t>
             </a:fld>
@@ -4419,7 +4424,7 @@
           <a:bodyPr/>
           <a:lstStyle/>
           <a:p>
-            <a:fld id="{80DAD540-7A9F-4B34-BAEC-EBC745D4E473}" type="datetimeFigureOut">
+            <a:fld id="{CF14A65E-FCAA-429A-BDDC-E3CFAC8FEDB7}" type="uaqdatetime1">
               <a:rPr lang="ar-SA" smtClean="0"/>
               <a:t>6/17/1440</a:t>
             </a:fld>
@@ -4514,7 +4519,7 @@
           <a:bodyPr/>
           <a:lstStyle/>
           <a:p>
-            <a:fld id="{80DAD540-7A9F-4B34-BAEC-EBC745D4E473}" type="datetimeFigureOut">
+            <a:fld id="{D49E48D0-B7D9-4B8E-8FA6-21360BB6584A}" type="uaqdatetime1">
               <a:rPr lang="ar-SA" smtClean="0"/>
               <a:t>6/17/1440</a:t>
             </a:fld>
@@ -4769,7 +4774,7 @@
           <a:bodyPr/>
           <a:lstStyle/>
           <a:p>
-            <a:fld id="{80DAD540-7A9F-4B34-BAEC-EBC745D4E473}" type="datetimeFigureOut">
+            <a:fld id="{4F89510C-8C61-41C7-AD42-BF8CE5341DEC}" type="uaqdatetime1">
               <a:rPr lang="ar-SA" smtClean="0"/>
               <a:t>6/17/1440</a:t>
             </a:fld>
@@ -5074,7 +5079,7 @@
           <a:bodyPr/>
           <a:lstStyle/>
           <a:p>
-            <a:fld id="{80DAD540-7A9F-4B34-BAEC-EBC745D4E473}" type="datetimeFigureOut">
+            <a:fld id="{6EF0866D-504F-4A57-B046-D26297D713DA}" type="uaqdatetime1">
               <a:rPr lang="ar-SA" smtClean="0"/>
               <a:t>6/17/1440</a:t>
             </a:fld>
@@ -5776,7 +5781,7 @@
             </a:lvl1pPr>
           </a:lstStyle>
           <a:p>
-            <a:fld id="{80DAD540-7A9F-4B34-BAEC-EBC745D4E473}" type="datetimeFigureOut">
+            <a:fld id="{7826B96B-FB18-49B3-9E13-EDD1A8763D09}" type="uaqdatetime1">
               <a:rPr lang="ar-SA" smtClean="0"/>
               <a:t>6/17/1440</a:t>
             </a:fld>
@@ -5886,6 +5891,7 @@
     <p:sldLayoutId id="2147483760" r:id="rId15"/>
     <p:sldLayoutId id="2147483761" r:id="rId16"/>
   </p:sldLayoutIdLst>
+  <p:hf hdr="0" ftr="0" dt="0"/>
   <p:txStyles>
     <p:titleStyle>
       <a:lvl1pPr algn="l" defTabSz="457200" rtl="1" eaLnBrk="1" latinLnBrk="0" hangingPunct="1">
@@ -8716,6 +8722,35 @@
           </a:p>
         </p:txBody>
       </p:sp>
+      <p:sp>
+        <p:nvSpPr>
+          <p:cNvPr id="6" name="Slide Number Placeholder 5">
+            <a:extLst>
+              <a:ext uri="{FF2B5EF4-FFF2-40B4-BE49-F238E27FC236}">
+                <a16:creationId xmlns:a16="http://schemas.microsoft.com/office/drawing/2014/main" id="{9F963B29-2E43-44FA-9480-83202726BCDD}"/>
+              </a:ext>
+            </a:extLst>
+          </p:cNvPr>
+          <p:cNvSpPr>
+            <a:spLocks noGrp="1"/>
+          </p:cNvSpPr>
+          <p:nvPr>
+            <p:ph type="sldNum" sz="quarter" idx="12"/>
+          </p:nvPr>
+        </p:nvSpPr>
+        <p:spPr/>
+        <p:txBody>
+          <a:bodyPr/>
+          <a:lstStyle/>
+          <a:p>
+            <a:fld id="{BA3098F8-634C-4D3D-BA4A-4EDA128784B8}" type="slidenum">
+              <a:rPr lang="ar-SA" smtClean="0"/>
+              <a:t>14</a:t>
+            </a:fld>
+            <a:endParaRPr lang="ar-SA"/>
+          </a:p>
+        </p:txBody>
+      </p:sp>
     </p:spTree>
     <p:extLst>
       <p:ext uri="{BB962C8B-B14F-4D97-AF65-F5344CB8AC3E}">
@@ -9441,6 +9476,35 @@
               <a:effectLst/>
               <a:latin typeface="Arial" panose="020B0604020202020204" pitchFamily="34" charset="0"/>
             </a:endParaRPr>
+          </a:p>
+        </p:txBody>
+      </p:sp>
+      <p:sp>
+        <p:nvSpPr>
+          <p:cNvPr id="4" name="Slide Number Placeholder 3">
+            <a:extLst>
+              <a:ext uri="{FF2B5EF4-FFF2-40B4-BE49-F238E27FC236}">
+                <a16:creationId xmlns:a16="http://schemas.microsoft.com/office/drawing/2014/main" id="{9CFF0656-4804-461C-81FD-53037ABDE086}"/>
+              </a:ext>
+            </a:extLst>
+          </p:cNvPr>
+          <p:cNvSpPr>
+            <a:spLocks noGrp="1"/>
+          </p:cNvSpPr>
+          <p:nvPr>
+            <p:ph type="sldNum" sz="quarter" idx="12"/>
+          </p:nvPr>
+        </p:nvSpPr>
+        <p:spPr/>
+        <p:txBody>
+          <a:bodyPr/>
+          <a:lstStyle/>
+          <a:p>
+            <a:fld id="{BA3098F8-634C-4D3D-BA4A-4EDA128784B8}" type="slidenum">
+              <a:rPr lang="ar-SA" smtClean="0"/>
+              <a:t>15</a:t>
+            </a:fld>
+            <a:endParaRPr lang="ar-SA"/>
           </a:p>
         </p:txBody>
       </p:sp>
@@ -10107,6 +10171,35 @@
           </a:fontRef>
         </p:style>
       </p:cxnSp>
+      <p:sp>
+        <p:nvSpPr>
+          <p:cNvPr id="5" name="Slide Number Placeholder 4">
+            <a:extLst>
+              <a:ext uri="{FF2B5EF4-FFF2-40B4-BE49-F238E27FC236}">
+                <a16:creationId xmlns:a16="http://schemas.microsoft.com/office/drawing/2014/main" id="{67AD37C8-F9C5-494B-BBB0-9DD170CF5BBC}"/>
+              </a:ext>
+            </a:extLst>
+          </p:cNvPr>
+          <p:cNvSpPr>
+            <a:spLocks noGrp="1"/>
+          </p:cNvSpPr>
+          <p:nvPr>
+            <p:ph type="sldNum" sz="quarter" idx="12"/>
+          </p:nvPr>
+        </p:nvSpPr>
+        <p:spPr/>
+        <p:txBody>
+          <a:bodyPr/>
+          <a:lstStyle/>
+          <a:p>
+            <a:fld id="{BA3098F8-634C-4D3D-BA4A-4EDA128784B8}" type="slidenum">
+              <a:rPr lang="ar-SA" smtClean="0"/>
+              <a:t>16</a:t>
+            </a:fld>
+            <a:endParaRPr lang="ar-SA"/>
+          </a:p>
+        </p:txBody>
+      </p:sp>
     </p:spTree>
     <p:extLst>
       <p:ext uri="{BB962C8B-B14F-4D97-AF65-F5344CB8AC3E}">
@@ -10197,6 +10290,35 @@
           </a:prstGeom>
         </p:spPr>
       </p:pic>
+      <p:sp>
+        <p:nvSpPr>
+          <p:cNvPr id="5" name="Slide Number Placeholder 4">
+            <a:extLst>
+              <a:ext uri="{FF2B5EF4-FFF2-40B4-BE49-F238E27FC236}">
+                <a16:creationId xmlns:a16="http://schemas.microsoft.com/office/drawing/2014/main" id="{A2BC5404-B361-45A3-AA2E-CF9673B89CD6}"/>
+              </a:ext>
+            </a:extLst>
+          </p:cNvPr>
+          <p:cNvSpPr>
+            <a:spLocks noGrp="1"/>
+          </p:cNvSpPr>
+          <p:nvPr>
+            <p:ph type="sldNum" sz="quarter" idx="12"/>
+          </p:nvPr>
+        </p:nvSpPr>
+        <p:spPr/>
+        <p:txBody>
+          <a:bodyPr/>
+          <a:lstStyle/>
+          <a:p>
+            <a:fld id="{BA3098F8-634C-4D3D-BA4A-4EDA128784B8}" type="slidenum">
+              <a:rPr lang="ar-SA" smtClean="0"/>
+              <a:t>17</a:t>
+            </a:fld>
+            <a:endParaRPr lang="ar-SA"/>
+          </a:p>
+        </p:txBody>
+      </p:sp>
     </p:spTree>
     <p:extLst>
       <p:ext uri="{BB962C8B-B14F-4D97-AF65-F5344CB8AC3E}">
@@ -10823,6 +10945,35 @@
               <a:t>Xu[n]={1,0,0,2,0,0,3}</a:t>
             </a:r>
             <a:endParaRPr lang="ar-SA" dirty="0"/>
+          </a:p>
+        </p:txBody>
+      </p:sp>
+      <p:sp>
+        <p:nvSpPr>
+          <p:cNvPr id="5" name="Slide Number Placeholder 4">
+            <a:extLst>
+              <a:ext uri="{FF2B5EF4-FFF2-40B4-BE49-F238E27FC236}">
+                <a16:creationId xmlns:a16="http://schemas.microsoft.com/office/drawing/2014/main" id="{5B7899FD-3BA3-4A35-AE67-17853298A638}"/>
+              </a:ext>
+            </a:extLst>
+          </p:cNvPr>
+          <p:cNvSpPr>
+            <a:spLocks noGrp="1"/>
+          </p:cNvSpPr>
+          <p:nvPr>
+            <p:ph type="sldNum" sz="quarter" idx="12"/>
+          </p:nvPr>
+        </p:nvSpPr>
+        <p:spPr/>
+        <p:txBody>
+          <a:bodyPr/>
+          <a:lstStyle/>
+          <a:p>
+            <a:fld id="{BA3098F8-634C-4D3D-BA4A-4EDA128784B8}" type="slidenum">
+              <a:rPr lang="ar-SA" smtClean="0"/>
+              <a:t>18</a:t>
+            </a:fld>
+            <a:endParaRPr lang="ar-SA"/>
           </a:p>
         </p:txBody>
       </p:sp>
@@ -10916,6 +11067,35 @@
           </a:prstGeom>
         </p:spPr>
       </p:pic>
+      <p:sp>
+        <p:nvSpPr>
+          <p:cNvPr id="5" name="Slide Number Placeholder 4">
+            <a:extLst>
+              <a:ext uri="{FF2B5EF4-FFF2-40B4-BE49-F238E27FC236}">
+                <a16:creationId xmlns:a16="http://schemas.microsoft.com/office/drawing/2014/main" id="{0B00CFB6-DF31-4376-87E6-DDDB1687ECE6}"/>
+              </a:ext>
+            </a:extLst>
+          </p:cNvPr>
+          <p:cNvSpPr>
+            <a:spLocks noGrp="1"/>
+          </p:cNvSpPr>
+          <p:nvPr>
+            <p:ph type="sldNum" sz="quarter" idx="12"/>
+          </p:nvPr>
+        </p:nvSpPr>
+        <p:spPr/>
+        <p:txBody>
+          <a:bodyPr/>
+          <a:lstStyle/>
+          <a:p>
+            <a:fld id="{BA3098F8-634C-4D3D-BA4A-4EDA128784B8}" type="slidenum">
+              <a:rPr lang="ar-SA" smtClean="0"/>
+              <a:t>19</a:t>
+            </a:fld>
+            <a:endParaRPr lang="ar-SA"/>
+          </a:p>
+        </p:txBody>
+      </p:sp>
     </p:spTree>
     <p:extLst>
       <p:ext uri="{BB962C8B-B14F-4D97-AF65-F5344CB8AC3E}">
@@ -11342,6 +11522,35 @@
           </a:p>
         </p:txBody>
       </p:sp>
+      <p:sp>
+        <p:nvSpPr>
+          <p:cNvPr id="8" name="Slide Number Placeholder 7">
+            <a:extLst>
+              <a:ext uri="{FF2B5EF4-FFF2-40B4-BE49-F238E27FC236}">
+                <a16:creationId xmlns:a16="http://schemas.microsoft.com/office/drawing/2014/main" id="{3E0BE595-7AF5-4066-AF27-29916520A5A9}"/>
+              </a:ext>
+            </a:extLst>
+          </p:cNvPr>
+          <p:cNvSpPr>
+            <a:spLocks noGrp="1"/>
+          </p:cNvSpPr>
+          <p:nvPr>
+            <p:ph type="sldNum" sz="quarter" idx="12"/>
+          </p:nvPr>
+        </p:nvSpPr>
+        <p:spPr/>
+        <p:txBody>
+          <a:bodyPr/>
+          <a:lstStyle/>
+          <a:p>
+            <a:fld id="{BA3098F8-634C-4D3D-BA4A-4EDA128784B8}" type="slidenum">
+              <a:rPr lang="ar-SA" smtClean="0"/>
+              <a:t>2</a:t>
+            </a:fld>
+            <a:endParaRPr lang="ar-SA"/>
+          </a:p>
+        </p:txBody>
+      </p:sp>
     </p:spTree>
     <p:extLst>
       <p:ext uri="{BB962C8B-B14F-4D97-AF65-F5344CB8AC3E}">
@@ -11414,6 +11623,35 @@
           </a:p>
         </p:txBody>
       </p:sp>
+      <p:sp>
+        <p:nvSpPr>
+          <p:cNvPr id="4" name="Slide Number Placeholder 3">
+            <a:extLst>
+              <a:ext uri="{FF2B5EF4-FFF2-40B4-BE49-F238E27FC236}">
+                <a16:creationId xmlns:a16="http://schemas.microsoft.com/office/drawing/2014/main" id="{DB027F04-6083-4F51-8531-7B4C02927615}"/>
+              </a:ext>
+            </a:extLst>
+          </p:cNvPr>
+          <p:cNvSpPr>
+            <a:spLocks noGrp="1"/>
+          </p:cNvSpPr>
+          <p:nvPr>
+            <p:ph type="sldNum" sz="quarter" idx="12"/>
+          </p:nvPr>
+        </p:nvSpPr>
+        <p:spPr/>
+        <p:txBody>
+          <a:bodyPr/>
+          <a:lstStyle/>
+          <a:p>
+            <a:fld id="{BA3098F8-634C-4D3D-BA4A-4EDA128784B8}" type="slidenum">
+              <a:rPr lang="ar-SA" smtClean="0"/>
+              <a:t>20</a:t>
+            </a:fld>
+            <a:endParaRPr lang="ar-SA"/>
+          </a:p>
+        </p:txBody>
+      </p:sp>
     </p:spTree>
     <p:extLst>
       <p:ext uri="{BB962C8B-B14F-4D97-AF65-F5344CB8AC3E}">
@@ -11794,6 +12032,35 @@
           </a:prstGeom>
         </p:spPr>
       </p:pic>
+      <p:sp>
+        <p:nvSpPr>
+          <p:cNvPr id="5" name="Slide Number Placeholder 4">
+            <a:extLst>
+              <a:ext uri="{FF2B5EF4-FFF2-40B4-BE49-F238E27FC236}">
+                <a16:creationId xmlns:a16="http://schemas.microsoft.com/office/drawing/2014/main" id="{E4A7E418-4055-4E85-A811-31D2483507CC}"/>
+              </a:ext>
+            </a:extLst>
+          </p:cNvPr>
+          <p:cNvSpPr>
+            <a:spLocks noGrp="1"/>
+          </p:cNvSpPr>
+          <p:nvPr>
+            <p:ph type="sldNum" sz="quarter" idx="12"/>
+          </p:nvPr>
+        </p:nvSpPr>
+        <p:spPr/>
+        <p:txBody>
+          <a:bodyPr/>
+          <a:lstStyle/>
+          <a:p>
+            <a:fld id="{BA3098F8-634C-4D3D-BA4A-4EDA128784B8}" type="slidenum">
+              <a:rPr lang="ar-SA" smtClean="0"/>
+              <a:t>21</a:t>
+            </a:fld>
+            <a:endParaRPr lang="ar-SA"/>
+          </a:p>
+        </p:txBody>
+      </p:sp>
     </p:spTree>
     <p:extLst>
       <p:ext uri="{BB962C8B-B14F-4D97-AF65-F5344CB8AC3E}">
@@ -12702,6 +12969,35 @@
           </a:p>
         </p:txBody>
       </p:sp>
+      <p:sp>
+        <p:nvSpPr>
+          <p:cNvPr id="4" name="Slide Number Placeholder 3">
+            <a:extLst>
+              <a:ext uri="{FF2B5EF4-FFF2-40B4-BE49-F238E27FC236}">
+                <a16:creationId xmlns:a16="http://schemas.microsoft.com/office/drawing/2014/main" id="{C6F0EA55-4EFB-4CC1-9304-0467E3C95431}"/>
+              </a:ext>
+            </a:extLst>
+          </p:cNvPr>
+          <p:cNvSpPr>
+            <a:spLocks noGrp="1"/>
+          </p:cNvSpPr>
+          <p:nvPr>
+            <p:ph type="sldNum" sz="quarter" idx="12"/>
+          </p:nvPr>
+        </p:nvSpPr>
+        <p:spPr/>
+        <p:txBody>
+          <a:bodyPr/>
+          <a:lstStyle/>
+          <a:p>
+            <a:fld id="{BA3098F8-634C-4D3D-BA4A-4EDA128784B8}" type="slidenum">
+              <a:rPr lang="ar-SA" smtClean="0"/>
+              <a:t>22</a:t>
+            </a:fld>
+            <a:endParaRPr lang="ar-SA"/>
+          </a:p>
+        </p:txBody>
+      </p:sp>
     </p:spTree>
     <p:extLst>
       <p:ext uri="{BB962C8B-B14F-4D97-AF65-F5344CB8AC3E}">
@@ -13153,6 +13449,35 @@
           </a:fontRef>
         </p:style>
       </p:cxnSp>
+      <p:sp>
+        <p:nvSpPr>
+          <p:cNvPr id="7" name="Slide Number Placeholder 6">
+            <a:extLst>
+              <a:ext uri="{FF2B5EF4-FFF2-40B4-BE49-F238E27FC236}">
+                <a16:creationId xmlns:a16="http://schemas.microsoft.com/office/drawing/2014/main" id="{C66DEF56-043F-44F6-97CF-39D086AF4DC6}"/>
+              </a:ext>
+            </a:extLst>
+          </p:cNvPr>
+          <p:cNvSpPr>
+            <a:spLocks noGrp="1"/>
+          </p:cNvSpPr>
+          <p:nvPr>
+            <p:ph type="sldNum" sz="quarter" idx="12"/>
+          </p:nvPr>
+        </p:nvSpPr>
+        <p:spPr/>
+        <p:txBody>
+          <a:bodyPr/>
+          <a:lstStyle/>
+          <a:p>
+            <a:fld id="{BA3098F8-634C-4D3D-BA4A-4EDA128784B8}" type="slidenum">
+              <a:rPr lang="ar-SA" smtClean="0"/>
+              <a:t>23</a:t>
+            </a:fld>
+            <a:endParaRPr lang="ar-SA"/>
+          </a:p>
+        </p:txBody>
+      </p:sp>
     </p:spTree>
     <p:extLst>
       <p:ext uri="{BB962C8B-B14F-4D97-AF65-F5344CB8AC3E}">
@@ -13213,6 +13538,35 @@
           </a:prstGeom>
         </p:spPr>
       </p:pic>
+      <p:sp>
+        <p:nvSpPr>
+          <p:cNvPr id="4" name="Slide Number Placeholder 3">
+            <a:extLst>
+              <a:ext uri="{FF2B5EF4-FFF2-40B4-BE49-F238E27FC236}">
+                <a16:creationId xmlns:a16="http://schemas.microsoft.com/office/drawing/2014/main" id="{6267783B-D807-4627-9408-91FD00D9DDCB}"/>
+              </a:ext>
+            </a:extLst>
+          </p:cNvPr>
+          <p:cNvSpPr>
+            <a:spLocks noGrp="1"/>
+          </p:cNvSpPr>
+          <p:nvPr>
+            <p:ph type="sldNum" sz="quarter" idx="12"/>
+          </p:nvPr>
+        </p:nvSpPr>
+        <p:spPr/>
+        <p:txBody>
+          <a:bodyPr/>
+          <a:lstStyle/>
+          <a:p>
+            <a:fld id="{BA3098F8-634C-4D3D-BA4A-4EDA128784B8}" type="slidenum">
+              <a:rPr lang="ar-SA" smtClean="0"/>
+              <a:t>24</a:t>
+            </a:fld>
+            <a:endParaRPr lang="ar-SA"/>
+          </a:p>
+        </p:txBody>
+      </p:sp>
     </p:spTree>
     <p:extLst>
       <p:ext uri="{BB962C8B-B14F-4D97-AF65-F5344CB8AC3E}">
@@ -13682,6 +14036,35 @@
           </a:prstGeom>
         </p:spPr>
       </p:pic>
+      <p:sp>
+        <p:nvSpPr>
+          <p:cNvPr id="5" name="Slide Number Placeholder 4">
+            <a:extLst>
+              <a:ext uri="{FF2B5EF4-FFF2-40B4-BE49-F238E27FC236}">
+                <a16:creationId xmlns:a16="http://schemas.microsoft.com/office/drawing/2014/main" id="{59B6E146-8D5B-403A-A42F-ECEA76198D89}"/>
+              </a:ext>
+            </a:extLst>
+          </p:cNvPr>
+          <p:cNvSpPr>
+            <a:spLocks noGrp="1"/>
+          </p:cNvSpPr>
+          <p:nvPr>
+            <p:ph type="sldNum" sz="quarter" idx="12"/>
+          </p:nvPr>
+        </p:nvSpPr>
+        <p:spPr/>
+        <p:txBody>
+          <a:bodyPr/>
+          <a:lstStyle/>
+          <a:p>
+            <a:fld id="{BA3098F8-634C-4D3D-BA4A-4EDA128784B8}" type="slidenum">
+              <a:rPr lang="ar-SA" smtClean="0"/>
+              <a:t>25</a:t>
+            </a:fld>
+            <a:endParaRPr lang="ar-SA"/>
+          </a:p>
+        </p:txBody>
+      </p:sp>
     </p:spTree>
     <p:extLst>
       <p:ext uri="{BB962C8B-B14F-4D97-AF65-F5344CB8AC3E}">
@@ -13712,6 +14095,147 @@
           <a:chExt cx="0" cy="0"/>
         </a:xfrm>
       </p:grpSpPr>
+      <p:pic>
+        <p:nvPicPr>
+          <p:cNvPr id="3" name="Picture 2">
+            <a:extLst>
+              <a:ext uri="{FF2B5EF4-FFF2-40B4-BE49-F238E27FC236}">
+                <a16:creationId xmlns:a16="http://schemas.microsoft.com/office/drawing/2014/main" id="{D9E57936-6E3E-4824-B29B-2C0AC5A4EFAF}"/>
+              </a:ext>
+            </a:extLst>
+          </p:cNvPr>
+          <p:cNvPicPr>
+            <a:picLocks noChangeAspect="1"/>
+          </p:cNvPicPr>
+          <p:nvPr/>
+        </p:nvPicPr>
+        <p:blipFill>
+          <a:blip r:embed="rId2"/>
+          <a:stretch>
+            <a:fillRect/>
+          </a:stretch>
+        </p:blipFill>
+        <p:spPr>
+          <a:xfrm>
+            <a:off x="459910" y="1455786"/>
+            <a:ext cx="7952264" cy="2764521"/>
+          </a:xfrm>
+          <a:prstGeom prst="rect">
+            <a:avLst/>
+          </a:prstGeom>
+        </p:spPr>
+      </p:pic>
+      <p:sp>
+        <p:nvSpPr>
+          <p:cNvPr id="4" name="TextBox 3">
+            <a:extLst>
+              <a:ext uri="{FF2B5EF4-FFF2-40B4-BE49-F238E27FC236}">
+                <a16:creationId xmlns:a16="http://schemas.microsoft.com/office/drawing/2014/main" id="{3807F224-5CFE-4E11-8560-B6983AC5BC50}"/>
+              </a:ext>
+            </a:extLst>
+          </p:cNvPr>
+          <p:cNvSpPr txBox="1"/>
+          <p:nvPr/>
+        </p:nvSpPr>
+        <p:spPr>
+          <a:xfrm>
+            <a:off x="459910" y="506437"/>
+            <a:ext cx="3559126" cy="461665"/>
+          </a:xfrm>
+          <a:prstGeom prst="rect">
+            <a:avLst/>
+          </a:prstGeom>
+          <a:noFill/>
+        </p:spPr>
+        <p:txBody>
+          <a:bodyPr wrap="square" rtlCol="1">
+            <a:spAutoFit/>
+          </a:bodyPr>
+          <a:lstStyle/>
+          <a:p>
+            <a:pPr marL="342900" indent="-342900">
+              <a:buFont typeface="Wingdings" panose="05000000000000000000" pitchFamily="2" charset="2"/>
+              <a:buChar char="ü"/>
+            </a:pPr>
+            <a:r>
+              <a:rPr lang="en-US" sz="2400" dirty="0">
+                <a:solidFill>
+                  <a:schemeClr val="accent2">
+                    <a:lumMod val="50000"/>
+                  </a:schemeClr>
+                </a:solidFill>
+              </a:rPr>
+              <a:t>Filter command:</a:t>
+            </a:r>
+            <a:endParaRPr lang="ar-SA" sz="2400" dirty="0">
+              <a:solidFill>
+                <a:schemeClr val="accent2">
+                  <a:lumMod val="50000"/>
+                </a:schemeClr>
+              </a:solidFill>
+            </a:endParaRPr>
+          </a:p>
+        </p:txBody>
+      </p:sp>
+      <p:sp>
+        <p:nvSpPr>
+          <p:cNvPr id="6" name="Slide Number Placeholder 5">
+            <a:extLst>
+              <a:ext uri="{FF2B5EF4-FFF2-40B4-BE49-F238E27FC236}">
+                <a16:creationId xmlns:a16="http://schemas.microsoft.com/office/drawing/2014/main" id="{7210AA4E-7ED3-4F09-B591-89C576622A2E}"/>
+              </a:ext>
+            </a:extLst>
+          </p:cNvPr>
+          <p:cNvSpPr>
+            <a:spLocks noGrp="1"/>
+          </p:cNvSpPr>
+          <p:nvPr>
+            <p:ph type="sldNum" sz="quarter" idx="12"/>
+          </p:nvPr>
+        </p:nvSpPr>
+        <p:spPr/>
+        <p:txBody>
+          <a:bodyPr/>
+          <a:lstStyle/>
+          <a:p>
+            <a:fld id="{BA3098F8-634C-4D3D-BA4A-4EDA128784B8}" type="slidenum">
+              <a:rPr lang="ar-SA" smtClean="0"/>
+              <a:t>26</a:t>
+            </a:fld>
+            <a:endParaRPr lang="ar-SA"/>
+          </a:p>
+        </p:txBody>
+      </p:sp>
+    </p:spTree>
+    <p:extLst>
+      <p:ext uri="{BB962C8B-B14F-4D97-AF65-F5344CB8AC3E}">
+        <p14:creationId xmlns:p14="http://schemas.microsoft.com/office/powerpoint/2010/main" val="3558212890"/>
+      </p:ext>
+    </p:extLst>
+  </p:cSld>
+  <p:clrMapOvr>
+    <a:masterClrMapping/>
+  </p:clrMapOvr>
+</p:sld>
+</file>
+
+<file path=ppt/slides/slide27.xml><?xml version="1.0" encoding="utf-8"?>
+<p:sld xmlns:a="http://schemas.openxmlformats.org/drawingml/2006/main" xmlns:r="http://schemas.openxmlformats.org/officeDocument/2006/relationships" xmlns:p="http://schemas.openxmlformats.org/presentationml/2006/main">
+  <p:cSld>
+    <p:spTree>
+      <p:nvGrpSpPr>
+        <p:cNvPr id="1" name=""/>
+        <p:cNvGrpSpPr/>
+        <p:nvPr/>
+      </p:nvGrpSpPr>
+      <p:grpSpPr>
+        <a:xfrm>
+          <a:off x="0" y="0"/>
+          <a:ext cx="0" cy="0"/>
+          <a:chOff x="0" y="0"/>
+          <a:chExt cx="0" cy="0"/>
+        </a:xfrm>
+      </p:grpSpPr>
       <p:sp>
         <p:nvSpPr>
           <p:cNvPr id="2" name="Rectangle 1">
@@ -13889,6 +14413,35 @@
           </a:p>
           <a:p>
             <a:endParaRPr lang="ar-SA" dirty="0"/>
+          </a:p>
+        </p:txBody>
+      </p:sp>
+      <p:sp>
+        <p:nvSpPr>
+          <p:cNvPr id="5" name="Slide Number Placeholder 4">
+            <a:extLst>
+              <a:ext uri="{FF2B5EF4-FFF2-40B4-BE49-F238E27FC236}">
+                <a16:creationId xmlns:a16="http://schemas.microsoft.com/office/drawing/2014/main" id="{E819CF3C-D851-4432-A1C9-FF50E14886DD}"/>
+              </a:ext>
+            </a:extLst>
+          </p:cNvPr>
+          <p:cNvSpPr>
+            <a:spLocks noGrp="1"/>
+          </p:cNvSpPr>
+          <p:nvPr>
+            <p:ph type="sldNum" sz="quarter" idx="12"/>
+          </p:nvPr>
+        </p:nvSpPr>
+        <p:spPr/>
+        <p:txBody>
+          <a:bodyPr/>
+          <a:lstStyle/>
+          <a:p>
+            <a:fld id="{BA3098F8-634C-4D3D-BA4A-4EDA128784B8}" type="slidenum">
+              <a:rPr lang="ar-SA" smtClean="0"/>
+              <a:t>27</a:t>
+            </a:fld>
+            <a:endParaRPr lang="ar-SA"/>
           </a:p>
         </p:txBody>
       </p:sp>
@@ -13905,7 +14458,7 @@
 </p:sld>
 </file>
 
-<file path=ppt/slides/slide27.xml><?xml version="1.0" encoding="utf-8"?>
+<file path=ppt/slides/slide28.xml><?xml version="1.0" encoding="utf-8"?>
 <p:sld xmlns:a="http://schemas.openxmlformats.org/drawingml/2006/main" xmlns:r="http://schemas.openxmlformats.org/officeDocument/2006/relationships" xmlns:p="http://schemas.openxmlformats.org/presentationml/2006/main">
   <p:cSld>
     <p:spTree>
@@ -14520,10 +15073,143 @@
           </a:prstGeom>
         </p:spPr>
       </p:pic>
+      <p:sp>
+        <p:nvSpPr>
+          <p:cNvPr id="4" name="Slide Number Placeholder 3">
+            <a:extLst>
+              <a:ext uri="{FF2B5EF4-FFF2-40B4-BE49-F238E27FC236}">
+                <a16:creationId xmlns:a16="http://schemas.microsoft.com/office/drawing/2014/main" id="{76AED01E-1D78-4BB0-8CE6-269F0099CE87}"/>
+              </a:ext>
+            </a:extLst>
+          </p:cNvPr>
+          <p:cNvSpPr>
+            <a:spLocks noGrp="1"/>
+          </p:cNvSpPr>
+          <p:nvPr>
+            <p:ph type="sldNum" sz="quarter" idx="12"/>
+          </p:nvPr>
+        </p:nvSpPr>
+        <p:spPr/>
+        <p:txBody>
+          <a:bodyPr/>
+          <a:lstStyle/>
+          <a:p>
+            <a:fld id="{BA3098F8-634C-4D3D-BA4A-4EDA128784B8}" type="slidenum">
+              <a:rPr lang="ar-SA" smtClean="0"/>
+              <a:t>28</a:t>
+            </a:fld>
+            <a:endParaRPr lang="ar-SA"/>
+          </a:p>
+        </p:txBody>
+      </p:sp>
     </p:spTree>
     <p:extLst>
       <p:ext uri="{BB962C8B-B14F-4D97-AF65-F5344CB8AC3E}">
         <p14:creationId xmlns:p14="http://schemas.microsoft.com/office/powerpoint/2010/main" val="2746961094"/>
+      </p:ext>
+    </p:extLst>
+  </p:cSld>
+  <p:clrMapOvr>
+    <a:masterClrMapping/>
+  </p:clrMapOvr>
+</p:sld>
+</file>
+
+<file path=ppt/slides/slide29.xml><?xml version="1.0" encoding="utf-8"?>
+<p:sld xmlns:a="http://schemas.openxmlformats.org/drawingml/2006/main" xmlns:r="http://schemas.openxmlformats.org/officeDocument/2006/relationships" xmlns:p="http://schemas.openxmlformats.org/presentationml/2006/main">
+  <p:cSld>
+    <p:spTree>
+      <p:nvGrpSpPr>
+        <p:cNvPr id="1" name=""/>
+        <p:cNvGrpSpPr/>
+        <p:nvPr/>
+      </p:nvGrpSpPr>
+      <p:grpSpPr>
+        <a:xfrm>
+          <a:off x="0" y="0"/>
+          <a:ext cx="0" cy="0"/>
+          <a:chOff x="0" y="0"/>
+          <a:chExt cx="0" cy="0"/>
+        </a:xfrm>
+      </p:grpSpPr>
+      <p:sp>
+        <p:nvSpPr>
+          <p:cNvPr id="2" name="Rectangle 1">
+            <a:extLst>
+              <a:ext uri="{FF2B5EF4-FFF2-40B4-BE49-F238E27FC236}">
+                <a16:creationId xmlns:a16="http://schemas.microsoft.com/office/drawing/2014/main" id="{BB7A6A19-96C4-4335-8424-2FD68DB8DCB3}"/>
+              </a:ext>
+            </a:extLst>
+          </p:cNvPr>
+          <p:cNvSpPr/>
+          <p:nvPr/>
+        </p:nvSpPr>
+        <p:spPr>
+          <a:xfrm>
+            <a:off x="609512" y="613676"/>
+            <a:ext cx="3882858" cy="369332"/>
+          </a:xfrm>
+          <a:prstGeom prst="rect">
+            <a:avLst/>
+          </a:prstGeom>
+        </p:spPr>
+        <p:txBody>
+          <a:bodyPr wrap="none">
+            <a:spAutoFit/>
+          </a:bodyPr>
+          <a:lstStyle/>
+          <a:p>
+            <a:pPr marL="285750" indent="-285750">
+              <a:buFont typeface="Arial" panose="020B0604020202020204" pitchFamily="34" charset="0"/>
+              <a:buChar char="•"/>
+            </a:pPr>
+            <a:r>
+              <a:rPr lang="en-US" dirty="0">
+                <a:solidFill>
+                  <a:schemeClr val="accent1">
+                    <a:lumMod val="50000"/>
+                  </a:schemeClr>
+                </a:solidFill>
+              </a:rPr>
+              <a:t>Time-invariant Discrete Systems:</a:t>
+            </a:r>
+            <a:endParaRPr lang="ar-SA" dirty="0"/>
+          </a:p>
+        </p:txBody>
+      </p:sp>
+      <p:sp>
+        <p:nvSpPr>
+          <p:cNvPr id="4" name="Slide Number Placeholder 3">
+            <a:extLst>
+              <a:ext uri="{FF2B5EF4-FFF2-40B4-BE49-F238E27FC236}">
+                <a16:creationId xmlns:a16="http://schemas.microsoft.com/office/drawing/2014/main" id="{967AD871-C7D0-4B1B-B2D9-AEF152DBB1C9}"/>
+              </a:ext>
+            </a:extLst>
+          </p:cNvPr>
+          <p:cNvSpPr>
+            <a:spLocks noGrp="1"/>
+          </p:cNvSpPr>
+          <p:nvPr>
+            <p:ph type="sldNum" sz="quarter" idx="12"/>
+          </p:nvPr>
+        </p:nvSpPr>
+        <p:spPr/>
+        <p:txBody>
+          <a:bodyPr/>
+          <a:lstStyle/>
+          <a:p>
+            <a:fld id="{BA3098F8-634C-4D3D-BA4A-4EDA128784B8}" type="slidenum">
+              <a:rPr lang="ar-SA" smtClean="0"/>
+              <a:t>29</a:t>
+            </a:fld>
+            <a:endParaRPr lang="ar-SA"/>
+          </a:p>
+        </p:txBody>
+      </p:sp>
+    </p:spTree>
+    <p:extLst>
+      <p:ext uri="{BB962C8B-B14F-4D97-AF65-F5344CB8AC3E}">
+        <p14:creationId xmlns:p14="http://schemas.microsoft.com/office/powerpoint/2010/main" val="2116845578"/>
       </p:ext>
     </p:extLst>
   </p:cSld>
@@ -15080,6 +15766,882 @@
     <p:extLst>
       <p:ext uri="{BB962C8B-B14F-4D97-AF65-F5344CB8AC3E}">
         <p14:creationId xmlns:p14="http://schemas.microsoft.com/office/powerpoint/2010/main" val="3012519729"/>
+      </p:ext>
+    </p:extLst>
+  </p:cSld>
+  <p:clrMapOvr>
+    <a:masterClrMapping/>
+  </p:clrMapOvr>
+</p:sld>
+</file>
+
+<file path=ppt/slides/slide30.xml><?xml version="1.0" encoding="utf-8"?>
+<p:sld xmlns:a="http://schemas.openxmlformats.org/drawingml/2006/main" xmlns:r="http://schemas.openxmlformats.org/officeDocument/2006/relationships" xmlns:p="http://schemas.openxmlformats.org/presentationml/2006/main">
+  <p:cSld>
+    <p:spTree>
+      <p:nvGrpSpPr>
+        <p:cNvPr id="1" name=""/>
+        <p:cNvGrpSpPr/>
+        <p:nvPr/>
+      </p:nvGrpSpPr>
+      <p:grpSpPr>
+        <a:xfrm>
+          <a:off x="0" y="0"/>
+          <a:ext cx="0" cy="0"/>
+          <a:chOff x="0" y="0"/>
+          <a:chExt cx="0" cy="0"/>
+        </a:xfrm>
+      </p:grpSpPr>
+      <p:sp>
+        <p:nvSpPr>
+          <p:cNvPr id="2" name="Rectangle 1">
+            <a:extLst>
+              <a:ext uri="{FF2B5EF4-FFF2-40B4-BE49-F238E27FC236}">
+                <a16:creationId xmlns:a16="http://schemas.microsoft.com/office/drawing/2014/main" id="{88E76EF4-B826-4C50-9162-BF8EE656BD8F}"/>
+              </a:ext>
+            </a:extLst>
+          </p:cNvPr>
+          <p:cNvSpPr/>
+          <p:nvPr/>
+        </p:nvSpPr>
+        <p:spPr>
+          <a:xfrm>
+            <a:off x="217267" y="472493"/>
+            <a:ext cx="4415761" cy="400110"/>
+          </a:xfrm>
+          <a:prstGeom prst="rect">
+            <a:avLst/>
+          </a:prstGeom>
+        </p:spPr>
+        <p:txBody>
+          <a:bodyPr wrap="none">
+            <a:spAutoFit/>
+          </a:bodyPr>
+          <a:lstStyle/>
+          <a:p>
+            <a:pPr marL="742950" lvl="1" indent="-285750">
+              <a:buFont typeface="Arial" panose="020B0604020202020204" pitchFamily="34" charset="0"/>
+              <a:buChar char="•"/>
+            </a:pPr>
+            <a:r>
+              <a:rPr lang="en-US" sz="2000" dirty="0">
+                <a:solidFill>
+                  <a:schemeClr val="accent1">
+                    <a:lumMod val="50000"/>
+                  </a:schemeClr>
+                </a:solidFill>
+              </a:rPr>
+              <a:t>Causal Discrete Time Systems:</a:t>
+            </a:r>
+          </a:p>
+        </p:txBody>
+      </p:sp>
+      <p:sp>
+        <p:nvSpPr>
+          <p:cNvPr id="4" name="Rectangle 1">
+            <a:extLst>
+              <a:ext uri="{FF2B5EF4-FFF2-40B4-BE49-F238E27FC236}">
+                <a16:creationId xmlns:a16="http://schemas.microsoft.com/office/drawing/2014/main" id="{10CE5F2F-4417-4496-BFBF-74A091B13318}"/>
+              </a:ext>
+            </a:extLst>
+          </p:cNvPr>
+          <p:cNvSpPr>
+            <a:spLocks noChangeArrowheads="1"/>
+          </p:cNvSpPr>
+          <p:nvPr/>
+        </p:nvSpPr>
+        <p:spPr bwMode="auto">
+          <a:xfrm>
+            <a:off x="2357438" y="3414713"/>
+            <a:ext cx="12192000" cy="0"/>
+          </a:xfrm>
+          <a:prstGeom prst="rect">
+            <a:avLst/>
+          </a:prstGeom>
+          <a:noFill/>
+          <a:ln>
+            <a:noFill/>
+          </a:ln>
+          <a:effectLst/>
+          <a:extLst>
+            <a:ext uri="{909E8E84-426E-40DD-AFC4-6F175D3DCCD1}">
+              <a14:hiddenFill xmlns:a14="http://schemas.microsoft.com/office/drawing/2010/main">
+                <a:solidFill>
+                  <a:schemeClr val="accent1"/>
+                </a:solidFill>
+              </a14:hiddenFill>
+            </a:ext>
+            <a:ext uri="{91240B29-F687-4F45-9708-019B960494DF}">
+              <a14:hiddenLine xmlns:a14="http://schemas.microsoft.com/office/drawing/2010/main" w="9525">
+                <a:solidFill>
+                  <a:schemeClr val="tx1"/>
+                </a:solidFill>
+                <a:miter lim="800000"/>
+                <a:headEnd/>
+                <a:tailEnd/>
+              </a14:hiddenLine>
+            </a:ext>
+            <a:ext uri="{AF507438-7753-43E0-B8FC-AC1667EBCBE1}">
+              <a14:hiddenEffects xmlns:a14="http://schemas.microsoft.com/office/drawing/2010/main">
+                <a:effectLst>
+                  <a:outerShdw dist="35921" dir="2700000" algn="ctr" rotWithShape="0">
+                    <a:schemeClr val="bg2"/>
+                  </a:outerShdw>
+                </a:effectLst>
+              </a14:hiddenEffects>
+            </a:ext>
+          </a:extLst>
+        </p:spPr>
+        <p:txBody>
+          <a:bodyPr vert="horz" wrap="none" lIns="91440" tIns="45720" rIns="91440" bIns="45720" numCol="1" anchor="ctr" anchorCtr="0" compatLnSpc="1">
+            <a:prstTxWarp prst="textNoShape">
+              <a:avLst/>
+            </a:prstTxWarp>
+            <a:spAutoFit/>
+          </a:bodyPr>
+          <a:lstStyle/>
+          <a:p>
+            <a:pPr marL="0" marR="0" lvl="0" indent="0" algn="l" defTabSz="914400" rtl="0" eaLnBrk="0" fontAlgn="base" latinLnBrk="0" hangingPunct="0">
+              <a:lnSpc>
+                <a:spcPct val="100000"/>
+              </a:lnSpc>
+              <a:spcBef>
+                <a:spcPct val="0"/>
+              </a:spcBef>
+              <a:spcAft>
+                <a:spcPct val="0"/>
+              </a:spcAft>
+              <a:buClrTx/>
+              <a:buSzTx/>
+              <a:buFontTx/>
+              <a:buNone/>
+              <a:tabLst/>
+            </a:pPr>
+            <a:br>
+              <a:rPr kumimoji="0" lang="ar-SA" altLang="ar-SA" sz="1800" b="0" i="0" u="none" strike="noStrike" cap="none" normalizeH="0" baseline="0">
+                <a:ln>
+                  <a:noFill/>
+                </a:ln>
+                <a:solidFill>
+                  <a:schemeClr val="tx1"/>
+                </a:solidFill>
+                <a:effectLst/>
+                <a:latin typeface="Arial" panose="020B0604020202020204" pitchFamily="34" charset="0"/>
+              </a:rPr>
+            </a:br>
+            <a:endParaRPr kumimoji="0" lang="ar-SA" altLang="ar-SA" sz="1800" b="0" i="0" u="none" strike="noStrike" cap="none" normalizeH="0" baseline="0">
+              <a:ln>
+                <a:noFill/>
+              </a:ln>
+              <a:solidFill>
+                <a:schemeClr val="tx1"/>
+              </a:solidFill>
+              <a:effectLst/>
+              <a:latin typeface="Arial" panose="020B0604020202020204" pitchFamily="34" charset="0"/>
+            </a:endParaRPr>
+          </a:p>
+        </p:txBody>
+      </p:sp>
+      <p:sp>
+        <p:nvSpPr>
+          <p:cNvPr id="5" name="TextBox 4">
+            <a:extLst>
+              <a:ext uri="{FF2B5EF4-FFF2-40B4-BE49-F238E27FC236}">
+                <a16:creationId xmlns:a16="http://schemas.microsoft.com/office/drawing/2014/main" id="{782BE3ED-4708-426C-9B47-B4A2D325B7FF}"/>
+              </a:ext>
+            </a:extLst>
+          </p:cNvPr>
+          <p:cNvSpPr txBox="1"/>
+          <p:nvPr/>
+        </p:nvSpPr>
+        <p:spPr>
+          <a:xfrm>
+            <a:off x="901147" y="1318834"/>
+            <a:ext cx="8415130" cy="1015663"/>
+          </a:xfrm>
+          <a:prstGeom prst="rect">
+            <a:avLst/>
+          </a:prstGeom>
+          <a:noFill/>
+        </p:spPr>
+        <p:txBody>
+          <a:bodyPr wrap="square" rtlCol="1">
+            <a:spAutoFit/>
+          </a:bodyPr>
+          <a:lstStyle/>
+          <a:p>
+            <a:r>
+              <a:rPr lang="en-US" sz="2000" dirty="0">
+                <a:solidFill>
+                  <a:srgbClr val="000000"/>
+                </a:solidFill>
+                <a:latin typeface="TimesNewRomanPSMT"/>
+              </a:rPr>
+              <a:t>A system is said to be causal, if the </a:t>
+            </a:r>
+            <a:r>
+              <a:rPr lang="en-US" sz="2000" dirty="0">
+                <a:solidFill>
+                  <a:srgbClr val="002060"/>
+                </a:solidFill>
+                <a:latin typeface="TimesNewRomanPSMT"/>
+              </a:rPr>
+              <a:t>output</a:t>
+            </a:r>
+            <a:r>
+              <a:rPr lang="en-US" sz="2000" dirty="0">
+                <a:solidFill>
+                  <a:srgbClr val="000000"/>
+                </a:solidFill>
+                <a:latin typeface="TimesNewRomanPSMT"/>
+              </a:rPr>
+              <a:t> of the system at any time n (y(n)) depends </a:t>
+            </a:r>
+            <a:r>
+              <a:rPr lang="en-US" sz="2000" dirty="0">
+                <a:solidFill>
+                  <a:srgbClr val="C00000"/>
+                </a:solidFill>
+                <a:latin typeface="TimesNewRomanPSMT"/>
+              </a:rPr>
+              <a:t>only</a:t>
+            </a:r>
+            <a:r>
+              <a:rPr lang="en-US" sz="2000" dirty="0">
+                <a:solidFill>
+                  <a:srgbClr val="000000"/>
+                </a:solidFill>
+                <a:latin typeface="TimesNewRomanPSMT"/>
+              </a:rPr>
+              <a:t> on the </a:t>
+            </a:r>
+            <a:r>
+              <a:rPr lang="en-US" sz="2000" dirty="0">
+                <a:solidFill>
+                  <a:srgbClr val="002060"/>
+                </a:solidFill>
+                <a:latin typeface="TimesNewRomanPSMT"/>
+              </a:rPr>
+              <a:t>present</a:t>
+            </a:r>
+            <a:r>
+              <a:rPr lang="en-US" sz="2000" dirty="0">
+                <a:solidFill>
+                  <a:srgbClr val="000000"/>
+                </a:solidFill>
+                <a:latin typeface="TimesNewRomanPSMT"/>
+              </a:rPr>
+              <a:t> and </a:t>
+            </a:r>
+            <a:r>
+              <a:rPr lang="en-US" sz="2000" dirty="0">
+                <a:solidFill>
+                  <a:srgbClr val="002060"/>
+                </a:solidFill>
+                <a:latin typeface="TimesNewRomanPSMT"/>
+              </a:rPr>
+              <a:t>past</a:t>
+            </a:r>
+            <a:r>
+              <a:rPr lang="en-US" sz="2000" dirty="0">
+                <a:solidFill>
+                  <a:srgbClr val="000000"/>
+                </a:solidFill>
+                <a:latin typeface="TimesNewRomanPSMT"/>
+              </a:rPr>
+              <a:t> </a:t>
+            </a:r>
+            <a:r>
+              <a:rPr lang="en-US" sz="2000" dirty="0">
+                <a:solidFill>
+                  <a:srgbClr val="002060"/>
+                </a:solidFill>
+                <a:latin typeface="TimesNewRomanPSMT"/>
+              </a:rPr>
+              <a:t>inputs</a:t>
+            </a:r>
+            <a:r>
+              <a:rPr lang="en-US" sz="2000" dirty="0">
+                <a:solidFill>
+                  <a:srgbClr val="000000"/>
+                </a:solidFill>
+                <a:latin typeface="TimesNewRomanPSMT"/>
+              </a:rPr>
+              <a:t> ,But does not depend on future inputs</a:t>
+            </a:r>
+            <a:endParaRPr lang="ar-SA" sz="2000" dirty="0">
+              <a:solidFill>
+                <a:srgbClr val="000000"/>
+              </a:solidFill>
+              <a:latin typeface="TimesNewRomanPSMT"/>
+            </a:endParaRPr>
+          </a:p>
+        </p:txBody>
+      </p:sp>
+      <p:sp>
+        <p:nvSpPr>
+          <p:cNvPr id="6" name="TextBox 5">
+            <a:extLst>
+              <a:ext uri="{FF2B5EF4-FFF2-40B4-BE49-F238E27FC236}">
+                <a16:creationId xmlns:a16="http://schemas.microsoft.com/office/drawing/2014/main" id="{35DC2D1C-AD97-4D8B-8C83-1A7232855052}"/>
+              </a:ext>
+            </a:extLst>
+          </p:cNvPr>
+          <p:cNvSpPr txBox="1"/>
+          <p:nvPr/>
+        </p:nvSpPr>
+        <p:spPr>
+          <a:xfrm>
+            <a:off x="1498889" y="2780728"/>
+            <a:ext cx="6056244" cy="954107"/>
+          </a:xfrm>
+          <a:prstGeom prst="rect">
+            <a:avLst/>
+          </a:prstGeom>
+          <a:noFill/>
+        </p:spPr>
+        <p:txBody>
+          <a:bodyPr wrap="square" rtlCol="1">
+            <a:spAutoFit/>
+          </a:bodyPr>
+          <a:lstStyle/>
+          <a:p>
+            <a:r>
+              <a:rPr lang="en-US" dirty="0"/>
+              <a:t>Y[n] = X[n]       &gt;&gt;</a:t>
+            </a:r>
+            <a:r>
+              <a:rPr lang="en-US" dirty="0">
+                <a:solidFill>
+                  <a:schemeClr val="accent1">
+                    <a:lumMod val="50000"/>
+                  </a:schemeClr>
+                </a:solidFill>
+              </a:rPr>
+              <a:t> Causal</a:t>
+            </a:r>
+            <a:endParaRPr lang="en-US" dirty="0"/>
+          </a:p>
+          <a:p>
+            <a:r>
+              <a:rPr lang="en-US" dirty="0"/>
+              <a:t>Y[n] = X[n+1]   &gt;&gt;</a:t>
+            </a:r>
+            <a:r>
+              <a:rPr lang="en-US" dirty="0">
+                <a:solidFill>
+                  <a:schemeClr val="accent1">
+                    <a:lumMod val="50000"/>
+                  </a:schemeClr>
+                </a:solidFill>
+              </a:rPr>
+              <a:t> Non Causal</a:t>
+            </a:r>
+            <a:endParaRPr lang="en-US" dirty="0"/>
+          </a:p>
+          <a:p>
+            <a:r>
+              <a:rPr lang="en-US" dirty="0"/>
+              <a:t>Y[n] = X[n-1]    &gt;&gt;</a:t>
+            </a:r>
+            <a:r>
+              <a:rPr lang="en-US" dirty="0">
+                <a:solidFill>
+                  <a:schemeClr val="accent1">
+                    <a:lumMod val="50000"/>
+                  </a:schemeClr>
+                </a:solidFill>
+              </a:rPr>
+              <a:t> Causal</a:t>
+            </a:r>
+            <a:endParaRPr lang="ar-SA" dirty="0"/>
+          </a:p>
+        </p:txBody>
+      </p:sp>
+      <p:sp>
+        <p:nvSpPr>
+          <p:cNvPr id="7" name="Slide Number Placeholder 6">
+            <a:extLst>
+              <a:ext uri="{FF2B5EF4-FFF2-40B4-BE49-F238E27FC236}">
+                <a16:creationId xmlns:a16="http://schemas.microsoft.com/office/drawing/2014/main" id="{C63EDC89-AFCC-4D0B-A5DF-12D447D9EA1B}"/>
+              </a:ext>
+            </a:extLst>
+          </p:cNvPr>
+          <p:cNvSpPr>
+            <a:spLocks noGrp="1"/>
+          </p:cNvSpPr>
+          <p:nvPr>
+            <p:ph type="sldNum" sz="quarter" idx="12"/>
+          </p:nvPr>
+        </p:nvSpPr>
+        <p:spPr/>
+        <p:txBody>
+          <a:bodyPr/>
+          <a:lstStyle/>
+          <a:p>
+            <a:fld id="{BA3098F8-634C-4D3D-BA4A-4EDA128784B8}" type="slidenum">
+              <a:rPr lang="ar-SA" smtClean="0"/>
+              <a:t>30</a:t>
+            </a:fld>
+            <a:endParaRPr lang="ar-SA"/>
+          </a:p>
+        </p:txBody>
+      </p:sp>
+    </p:spTree>
+    <p:extLst>
+      <p:ext uri="{BB962C8B-B14F-4D97-AF65-F5344CB8AC3E}">
+        <p14:creationId xmlns:p14="http://schemas.microsoft.com/office/powerpoint/2010/main" val="1389013520"/>
+      </p:ext>
+    </p:extLst>
+  </p:cSld>
+  <p:clrMapOvr>
+    <a:masterClrMapping/>
+  </p:clrMapOvr>
+</p:sld>
+</file>
+
+<file path=ppt/slides/slide31.xml><?xml version="1.0" encoding="utf-8"?>
+<p:sld xmlns:a="http://schemas.openxmlformats.org/drawingml/2006/main" xmlns:r="http://schemas.openxmlformats.org/officeDocument/2006/relationships" xmlns:p="http://schemas.openxmlformats.org/presentationml/2006/main">
+  <p:cSld>
+    <p:spTree>
+      <p:nvGrpSpPr>
+        <p:cNvPr id="1" name=""/>
+        <p:cNvGrpSpPr/>
+        <p:nvPr/>
+      </p:nvGrpSpPr>
+      <p:grpSpPr>
+        <a:xfrm>
+          <a:off x="0" y="0"/>
+          <a:ext cx="0" cy="0"/>
+          <a:chOff x="0" y="0"/>
+          <a:chExt cx="0" cy="0"/>
+        </a:xfrm>
+      </p:grpSpPr>
+      <p:sp>
+        <p:nvSpPr>
+          <p:cNvPr id="2" name="TextBox 1">
+            <a:extLst>
+              <a:ext uri="{FF2B5EF4-FFF2-40B4-BE49-F238E27FC236}">
+                <a16:creationId xmlns:a16="http://schemas.microsoft.com/office/drawing/2014/main" id="{71B321EA-A19A-434E-ADBA-B81030087D2C}"/>
+              </a:ext>
+            </a:extLst>
+          </p:cNvPr>
+          <p:cNvSpPr txBox="1"/>
+          <p:nvPr/>
+        </p:nvSpPr>
+        <p:spPr>
+          <a:xfrm>
+            <a:off x="742122" y="702365"/>
+            <a:ext cx="3445565" cy="6309420"/>
+          </a:xfrm>
+          <a:prstGeom prst="rect">
+            <a:avLst/>
+          </a:prstGeom>
+          <a:noFill/>
+        </p:spPr>
+        <p:txBody>
+          <a:bodyPr wrap="square" rtlCol="1">
+            <a:spAutoFit/>
+          </a:bodyPr>
+          <a:lstStyle/>
+          <a:p>
+            <a:r>
+              <a:rPr lang="en-US" sz="1600" dirty="0"/>
+              <a:t>clc;</a:t>
+            </a:r>
+          </a:p>
+          <a:p>
+            <a:r>
+              <a:rPr lang="en-US" sz="1600" dirty="0"/>
+              <a:t>clear all;</a:t>
+            </a:r>
+          </a:p>
+          <a:p>
+            <a:r>
+              <a:rPr lang="en-US" sz="1600" dirty="0"/>
+              <a:t>close all;</a:t>
+            </a:r>
+          </a:p>
+          <a:p>
+            <a:r>
+              <a:rPr lang="en-US" sz="1600" dirty="0"/>
+              <a:t>%Properties of DT Systems(Causality)</a:t>
+            </a:r>
+          </a:p>
+          <a:p>
+            <a:r>
+              <a:rPr lang="en-US" sz="1600" dirty="0"/>
+              <a:t>%y(n)=x(-n);</a:t>
+            </a:r>
+          </a:p>
+          <a:p>
+            <a:r>
+              <a:rPr lang="ar-SA" sz="1600" dirty="0"/>
+              <a:t> </a:t>
+            </a:r>
+          </a:p>
+          <a:p>
+            <a:r>
+              <a:rPr lang="en-US" sz="1600" dirty="0"/>
+              <a:t>x1=input('Enter input sequence x1:');</a:t>
+            </a:r>
+          </a:p>
+          <a:p>
+            <a:r>
+              <a:rPr lang="en-US" sz="1600" dirty="0"/>
+              <a:t>n1=input('Enter lower limit n1:');</a:t>
+            </a:r>
+          </a:p>
+          <a:p>
+            <a:r>
+              <a:rPr lang="en-US" sz="1600" dirty="0"/>
+              <a:t>n2=input('Enter lower limit n2:');</a:t>
+            </a:r>
+          </a:p>
+          <a:p>
+            <a:r>
+              <a:rPr lang="en-US" sz="1600" dirty="0"/>
+              <a:t>flag=0;</a:t>
+            </a:r>
+          </a:p>
+          <a:p>
+            <a:r>
+              <a:rPr lang="en-US" sz="1600" dirty="0"/>
+              <a:t>for n=n1:n2</a:t>
+            </a:r>
+          </a:p>
+          <a:p>
+            <a:r>
+              <a:rPr lang="en-US" sz="1600" dirty="0" err="1"/>
+              <a:t>arg</a:t>
+            </a:r>
+            <a:r>
+              <a:rPr lang="en-US" sz="1600" dirty="0"/>
+              <a:t>=-n;</a:t>
+            </a:r>
+          </a:p>
+          <a:p>
+            <a:r>
+              <a:rPr lang="en-US" sz="1600" dirty="0"/>
+              <a:t>if </a:t>
+            </a:r>
+            <a:r>
+              <a:rPr lang="en-US" sz="1600" dirty="0" err="1"/>
+              <a:t>arg</a:t>
+            </a:r>
+            <a:r>
+              <a:rPr lang="en-US" sz="1600" dirty="0"/>
+              <a:t>&gt;n;</a:t>
+            </a:r>
+          </a:p>
+          <a:p>
+            <a:r>
+              <a:rPr lang="en-US" sz="1600" dirty="0"/>
+              <a:t>flag=1;</a:t>
+            </a:r>
+          </a:p>
+          <a:p>
+            <a:r>
+              <a:rPr lang="en-US" sz="1600" dirty="0"/>
+              <a:t>end;</a:t>
+            </a:r>
+          </a:p>
+          <a:p>
+            <a:r>
+              <a:rPr lang="en-US" sz="1600" dirty="0"/>
+              <a:t>end;</a:t>
+            </a:r>
+          </a:p>
+          <a:p>
+            <a:r>
+              <a:rPr lang="ar-SA" sz="1600" dirty="0"/>
+              <a:t> </a:t>
+            </a:r>
+          </a:p>
+          <a:p>
+            <a:r>
+              <a:rPr lang="en-US" sz="1600" dirty="0"/>
+              <a:t>if(flag==1)</a:t>
+            </a:r>
+          </a:p>
+          <a:p>
+            <a:r>
+              <a:rPr lang="en-US" sz="1600" dirty="0"/>
+              <a:t>display('system is causal');</a:t>
+            </a:r>
+          </a:p>
+          <a:p>
+            <a:r>
+              <a:rPr lang="en-US" sz="1600" dirty="0"/>
+              <a:t>else</a:t>
+            </a:r>
+          </a:p>
+          <a:p>
+            <a:r>
+              <a:rPr lang="en-US" sz="1600" dirty="0"/>
+              <a:t>    display('system is non-causal');</a:t>
+            </a:r>
+          </a:p>
+          <a:p>
+            <a:r>
+              <a:rPr lang="en-US" sz="1600" dirty="0"/>
+              <a:t>end;</a:t>
+            </a:r>
+          </a:p>
+          <a:p>
+            <a:endParaRPr lang="ar-SA" sz="1600" dirty="0"/>
+          </a:p>
+        </p:txBody>
+      </p:sp>
+      <p:sp>
+        <p:nvSpPr>
+          <p:cNvPr id="3" name="Rectangle 2">
+            <a:extLst>
+              <a:ext uri="{FF2B5EF4-FFF2-40B4-BE49-F238E27FC236}">
+                <a16:creationId xmlns:a16="http://schemas.microsoft.com/office/drawing/2014/main" id="{C356602E-6A99-4C95-A034-D07D63B2B133}"/>
+              </a:ext>
+            </a:extLst>
+          </p:cNvPr>
+          <p:cNvSpPr/>
+          <p:nvPr/>
+        </p:nvSpPr>
+        <p:spPr>
+          <a:xfrm>
+            <a:off x="564233" y="333033"/>
+            <a:ext cx="2105063" cy="369332"/>
+          </a:xfrm>
+          <a:prstGeom prst="rect">
+            <a:avLst/>
+          </a:prstGeom>
+        </p:spPr>
+        <p:txBody>
+          <a:bodyPr wrap="none">
+            <a:spAutoFit/>
+          </a:bodyPr>
+          <a:lstStyle/>
+          <a:p>
+            <a:r>
+              <a:rPr lang="en-US" dirty="0">
+                <a:solidFill>
+                  <a:schemeClr val="accent1">
+                    <a:lumMod val="50000"/>
+                  </a:schemeClr>
+                </a:solidFill>
+              </a:rPr>
+              <a:t>Implementation 2:</a:t>
+            </a:r>
+            <a:endParaRPr lang="ar-SA" dirty="0">
+              <a:solidFill>
+                <a:schemeClr val="accent1">
+                  <a:lumMod val="50000"/>
+                </a:schemeClr>
+              </a:solidFill>
+            </a:endParaRPr>
+          </a:p>
+        </p:txBody>
+      </p:sp>
+      <p:sp>
+        <p:nvSpPr>
+          <p:cNvPr id="5" name="Slide Number Placeholder 4">
+            <a:extLst>
+              <a:ext uri="{FF2B5EF4-FFF2-40B4-BE49-F238E27FC236}">
+                <a16:creationId xmlns:a16="http://schemas.microsoft.com/office/drawing/2014/main" id="{AB722B42-D171-42A8-A177-3F8B44EA204E}"/>
+              </a:ext>
+            </a:extLst>
+          </p:cNvPr>
+          <p:cNvSpPr>
+            <a:spLocks noGrp="1"/>
+          </p:cNvSpPr>
+          <p:nvPr>
+            <p:ph type="sldNum" sz="quarter" idx="12"/>
+          </p:nvPr>
+        </p:nvSpPr>
+        <p:spPr/>
+        <p:txBody>
+          <a:bodyPr/>
+          <a:lstStyle/>
+          <a:p>
+            <a:fld id="{BA3098F8-634C-4D3D-BA4A-4EDA128784B8}" type="slidenum">
+              <a:rPr lang="ar-SA" smtClean="0"/>
+              <a:t>31</a:t>
+            </a:fld>
+            <a:endParaRPr lang="ar-SA"/>
+          </a:p>
+        </p:txBody>
+      </p:sp>
+    </p:spTree>
+    <p:extLst>
+      <p:ext uri="{BB962C8B-B14F-4D97-AF65-F5344CB8AC3E}">
+        <p14:creationId xmlns:p14="http://schemas.microsoft.com/office/powerpoint/2010/main" val="2015208126"/>
+      </p:ext>
+    </p:extLst>
+  </p:cSld>
+  <p:clrMapOvr>
+    <a:masterClrMapping/>
+  </p:clrMapOvr>
+</p:sld>
+</file>
+
+<file path=ppt/slides/slide32.xml><?xml version="1.0" encoding="utf-8"?>
+<p:sld xmlns:a="http://schemas.openxmlformats.org/drawingml/2006/main" xmlns:r="http://schemas.openxmlformats.org/officeDocument/2006/relationships" xmlns:p="http://schemas.openxmlformats.org/presentationml/2006/main">
+  <p:cSld>
+    <p:spTree>
+      <p:nvGrpSpPr>
+        <p:cNvPr id="1" name=""/>
+        <p:cNvGrpSpPr/>
+        <p:nvPr/>
+      </p:nvGrpSpPr>
+      <p:grpSpPr>
+        <a:xfrm>
+          <a:off x="0" y="0"/>
+          <a:ext cx="0" cy="0"/>
+          <a:chOff x="0" y="0"/>
+          <a:chExt cx="0" cy="0"/>
+        </a:xfrm>
+      </p:grpSpPr>
+      <p:pic>
+        <p:nvPicPr>
+          <p:cNvPr id="2" name="Picture 1">
+            <a:extLst>
+              <a:ext uri="{FF2B5EF4-FFF2-40B4-BE49-F238E27FC236}">
+                <a16:creationId xmlns:a16="http://schemas.microsoft.com/office/drawing/2014/main" id="{75DBBCA1-8BB9-4611-AA4D-7679A5838BE1}"/>
+              </a:ext>
+            </a:extLst>
+          </p:cNvPr>
+          <p:cNvPicPr>
+            <a:picLocks noChangeAspect="1"/>
+          </p:cNvPicPr>
+          <p:nvPr/>
+        </p:nvPicPr>
+        <p:blipFill>
+          <a:blip r:embed="rId2"/>
+          <a:stretch>
+            <a:fillRect/>
+          </a:stretch>
+        </p:blipFill>
+        <p:spPr>
+          <a:xfrm>
+            <a:off x="475215" y="679588"/>
+            <a:ext cx="9106107" cy="5048250"/>
+          </a:xfrm>
+          <a:prstGeom prst="rect">
+            <a:avLst/>
+          </a:prstGeom>
+        </p:spPr>
+      </p:pic>
+      <p:cxnSp>
+        <p:nvCxnSpPr>
+          <p:cNvPr id="4" name="Straight Arrow Connector 3">
+            <a:extLst>
+              <a:ext uri="{FF2B5EF4-FFF2-40B4-BE49-F238E27FC236}">
+                <a16:creationId xmlns:a16="http://schemas.microsoft.com/office/drawing/2014/main" id="{B8D891DE-273F-41CB-BE42-47AA0D91FFE9}"/>
+              </a:ext>
+            </a:extLst>
+          </p:cNvPr>
+          <p:cNvCxnSpPr/>
+          <p:nvPr/>
+        </p:nvCxnSpPr>
+        <p:spPr>
+          <a:xfrm flipH="1" flipV="1">
+            <a:off x="1868557" y="1855304"/>
+            <a:ext cx="636104" cy="132522"/>
+          </a:xfrm>
+          <a:prstGeom prst="straightConnector1">
+            <a:avLst/>
+          </a:prstGeom>
+          <a:ln>
+            <a:tailEnd type="triangle"/>
+          </a:ln>
+        </p:spPr>
+        <p:style>
+          <a:lnRef idx="3">
+            <a:schemeClr val="accent1"/>
+          </a:lnRef>
+          <a:fillRef idx="0">
+            <a:schemeClr val="accent1"/>
+          </a:fillRef>
+          <a:effectRef idx="2">
+            <a:schemeClr val="accent1"/>
+          </a:effectRef>
+          <a:fontRef idx="minor">
+            <a:schemeClr val="tx1"/>
+          </a:fontRef>
+        </p:style>
+      </p:cxnSp>
+      <p:cxnSp>
+        <p:nvCxnSpPr>
+          <p:cNvPr id="6" name="Straight Arrow Connector 5">
+            <a:extLst>
+              <a:ext uri="{FF2B5EF4-FFF2-40B4-BE49-F238E27FC236}">
+                <a16:creationId xmlns:a16="http://schemas.microsoft.com/office/drawing/2014/main" id="{C8C501A5-649E-4CCD-AB1F-A7A91020C7CE}"/>
+              </a:ext>
+            </a:extLst>
+          </p:cNvPr>
+          <p:cNvCxnSpPr>
+            <a:cxnSpLocks/>
+          </p:cNvCxnSpPr>
+          <p:nvPr/>
+        </p:nvCxnSpPr>
+        <p:spPr>
+          <a:xfrm flipH="1" flipV="1">
+            <a:off x="1974574" y="5592417"/>
+            <a:ext cx="238539" cy="477079"/>
+          </a:xfrm>
+          <a:prstGeom prst="straightConnector1">
+            <a:avLst/>
+          </a:prstGeom>
+          <a:ln>
+            <a:tailEnd type="triangle"/>
+          </a:ln>
+        </p:spPr>
+        <p:style>
+          <a:lnRef idx="3">
+            <a:schemeClr val="accent1"/>
+          </a:lnRef>
+          <a:fillRef idx="0">
+            <a:schemeClr val="accent1"/>
+          </a:fillRef>
+          <a:effectRef idx="2">
+            <a:schemeClr val="accent1"/>
+          </a:effectRef>
+          <a:fontRef idx="minor">
+            <a:schemeClr val="tx1"/>
+          </a:fontRef>
+        </p:style>
+      </p:cxnSp>
+      <p:sp>
+        <p:nvSpPr>
+          <p:cNvPr id="5" name="Slide Number Placeholder 4">
+            <a:extLst>
+              <a:ext uri="{FF2B5EF4-FFF2-40B4-BE49-F238E27FC236}">
+                <a16:creationId xmlns:a16="http://schemas.microsoft.com/office/drawing/2014/main" id="{AC4C488B-5AF8-484A-8DB2-7B1D14BA20EC}"/>
+              </a:ext>
+            </a:extLst>
+          </p:cNvPr>
+          <p:cNvSpPr>
+            <a:spLocks noGrp="1"/>
+          </p:cNvSpPr>
+          <p:nvPr>
+            <p:ph type="sldNum" sz="quarter" idx="12"/>
+          </p:nvPr>
+        </p:nvSpPr>
+        <p:spPr/>
+        <p:txBody>
+          <a:bodyPr/>
+          <a:lstStyle/>
+          <a:p>
+            <a:fld id="{BA3098F8-634C-4D3D-BA4A-4EDA128784B8}" type="slidenum">
+              <a:rPr lang="ar-SA" smtClean="0"/>
+              <a:t>32</a:t>
+            </a:fld>
+            <a:endParaRPr lang="ar-SA"/>
+          </a:p>
+        </p:txBody>
+      </p:sp>
+    </p:spTree>
+    <p:extLst>
+      <p:ext uri="{BB962C8B-B14F-4D97-AF65-F5344CB8AC3E}">
+        <p14:creationId xmlns:p14="http://schemas.microsoft.com/office/powerpoint/2010/main" val="1316836092"/>
       </p:ext>
     </p:extLst>
   </p:cSld>

</xml_diff>